<commit_message>
added 1 slide each in 3.3 and 3.4 - traits of SE, why are projects late
</commit_message>
<xml_diff>
--- a/Slides/Lesson 3.3 Agile Planning and Estimation.pptx
+++ b/Slides/Lesson 3.3 Agile Planning and Estimation.pptx
@@ -5,7 +5,7 @@
     <p:sldMasterId id="2147483648" r:id="rId1"/>
   </p:sldMasterIdLst>
   <p:notesMasterIdLst>
-    <p:notesMasterId r:id="rId21"/>
+    <p:notesMasterId r:id="rId22"/>
   </p:notesMasterIdLst>
   <p:sldIdLst>
     <p:sldId id="485" r:id="rId2"/>
@@ -26,33 +26,34 @@
     <p:sldId id="547" r:id="rId17"/>
     <p:sldId id="545" r:id="rId18"/>
     <p:sldId id="543" r:id="rId19"/>
-    <p:sldId id="518" r:id="rId20"/>
+    <p:sldId id="272" r:id="rId20"/>
+    <p:sldId id="518" r:id="rId21"/>
   </p:sldIdLst>
   <p:sldSz cx="12192000" cy="6858000"/>
   <p:notesSz cx="6858000" cy="9144000"/>
   <p:embeddedFontLst>
     <p:embeddedFont>
       <p:font typeface="Calibri" panose="020F0502020204030204" pitchFamily="34" charset="0"/>
-      <p:regular r:id="rId22"/>
-      <p:bold r:id="rId23"/>
-      <p:italic r:id="rId24"/>
-      <p:boldItalic r:id="rId25"/>
+      <p:regular r:id="rId23"/>
+      <p:bold r:id="rId24"/>
+      <p:italic r:id="rId25"/>
+      <p:boldItalic r:id="rId26"/>
     </p:embeddedFont>
     <p:embeddedFont>
       <p:font typeface="Calibri Light" panose="020F0302020204030204" pitchFamily="34" charset="0"/>
-      <p:regular r:id="rId26"/>
-      <p:italic r:id="rId27"/>
+      <p:regular r:id="rId27"/>
+      <p:italic r:id="rId28"/>
     </p:embeddedFont>
     <p:embeddedFont>
       <p:font typeface="Ink Free" panose="03080402000500000000" pitchFamily="66" charset="0"/>
-      <p:regular r:id="rId28"/>
+      <p:regular r:id="rId29"/>
     </p:embeddedFont>
     <p:embeddedFont>
       <p:font typeface="Verdana" panose="020B0604030504040204" pitchFamily="34" charset="0"/>
-      <p:regular r:id="rId29"/>
-      <p:bold r:id="rId30"/>
-      <p:italic r:id="rId31"/>
-      <p:boldItalic r:id="rId32"/>
+      <p:regular r:id="rId30"/>
+      <p:bold r:id="rId31"/>
+      <p:italic r:id="rId32"/>
+      <p:boldItalic r:id="rId33"/>
     </p:embeddedFont>
   </p:embeddedFontLst>
   <p:defaultTextStyle>
@@ -173,6 +174,7 @@
             <p14:sldId id="547"/>
             <p14:sldId id="545"/>
             <p14:sldId id="543"/>
+            <p14:sldId id="272"/>
             <p14:sldId id="518"/>
           </p14:sldIdLst>
         </p14:section>
@@ -267,7 +269,7 @@
           <a:p>
             <a:fld id="{7C7E5181-6CF5-45F7-A87A-E0E0B1FD7549}" type="datetimeFigureOut">
               <a:rPr lang="en-US" smtClean="0"/>
-              <a:t>1/29/22</a:t>
+              <a:t>2/2/2022</a:t>
             </a:fld>
             <a:endParaRPr lang="en-US"/>
           </a:p>
@@ -2012,7 +2014,7 @@
           <a:lstStyle/>
           <a:p>
             <a:r>
-              <a:rPr lang="en-US" dirty="0"/>
+              <a:rPr lang="en-US"/>
               <a:t>&lt;read slide&gt;</a:t>
             </a:r>
           </a:p>
@@ -2044,7 +2046,7 @@
     </p:spTree>
     <p:extLst>
       <p:ext uri="{BB962C8B-B14F-4D97-AF65-F5344CB8AC3E}">
-        <p14:creationId xmlns:p14="http://schemas.microsoft.com/office/powerpoint/2010/main" val="3813056222"/>
+        <p14:creationId xmlns:p14="http://schemas.microsoft.com/office/powerpoint/2010/main" val="1509609614"/>
       </p:ext>
     </p:extLst>
   </p:cSld>
@@ -2132,6 +2134,93 @@
     <p:extLst>
       <p:ext uri="{BB962C8B-B14F-4D97-AF65-F5344CB8AC3E}">
         <p14:creationId xmlns:p14="http://schemas.microsoft.com/office/powerpoint/2010/main" val="1624675966"/>
+      </p:ext>
+    </p:extLst>
+  </p:cSld>
+  <p:clrMapOvr>
+    <a:masterClrMapping/>
+  </p:clrMapOvr>
+</p:notes>
+</file>
+
+<file path=ppt/notesSlides/notesSlide20.xml><?xml version="1.0" encoding="utf-8"?>
+<p:notes xmlns:a="http://schemas.openxmlformats.org/drawingml/2006/main" xmlns:r="http://schemas.openxmlformats.org/officeDocument/2006/relationships" xmlns:p="http://schemas.openxmlformats.org/presentationml/2006/main">
+  <p:cSld>
+    <p:spTree>
+      <p:nvGrpSpPr>
+        <p:cNvPr id="1" name=""/>
+        <p:cNvGrpSpPr/>
+        <p:nvPr/>
+      </p:nvGrpSpPr>
+      <p:grpSpPr>
+        <a:xfrm>
+          <a:off x="0" y="0"/>
+          <a:ext cx="0" cy="0"/>
+          <a:chOff x="0" y="0"/>
+          <a:chExt cx="0" cy="0"/>
+        </a:xfrm>
+      </p:grpSpPr>
+      <p:sp>
+        <p:nvSpPr>
+          <p:cNvPr id="2" name="Slide Image Placeholder 1"/>
+          <p:cNvSpPr>
+            <a:spLocks noGrp="1" noRot="1" noChangeAspect="1"/>
+          </p:cNvSpPr>
+          <p:nvPr>
+            <p:ph type="sldImg"/>
+          </p:nvPr>
+        </p:nvSpPr>
+        <p:spPr/>
+      </p:sp>
+      <p:sp>
+        <p:nvSpPr>
+          <p:cNvPr id="3" name="Notes Placeholder 2"/>
+          <p:cNvSpPr>
+            <a:spLocks noGrp="1"/>
+          </p:cNvSpPr>
+          <p:nvPr>
+            <p:ph type="body" idx="1"/>
+          </p:nvPr>
+        </p:nvSpPr>
+        <p:spPr/>
+        <p:txBody>
+          <a:bodyPr/>
+          <a:lstStyle/>
+          <a:p>
+            <a:r>
+              <a:rPr lang="en-US" dirty="0"/>
+              <a:t>&lt;read slide&gt;</a:t>
+            </a:r>
+          </a:p>
+        </p:txBody>
+      </p:sp>
+      <p:sp>
+        <p:nvSpPr>
+          <p:cNvPr id="4" name="Slide Number Placeholder 3"/>
+          <p:cNvSpPr>
+            <a:spLocks noGrp="1"/>
+          </p:cNvSpPr>
+          <p:nvPr>
+            <p:ph type="sldNum" sz="quarter" idx="5"/>
+          </p:nvPr>
+        </p:nvSpPr>
+        <p:spPr/>
+        <p:txBody>
+          <a:bodyPr/>
+          <a:lstStyle/>
+          <a:p>
+            <a:fld id="{07937F07-1250-4CCE-B198-1B2887014F41}" type="slidenum">
+              <a:rPr lang="en-US" smtClean="0"/>
+              <a:t>20</a:t>
+            </a:fld>
+            <a:endParaRPr lang="en-US"/>
+          </a:p>
+        </p:txBody>
+      </p:sp>
+    </p:spTree>
+    <p:extLst>
+      <p:ext uri="{BB962C8B-B14F-4D97-AF65-F5344CB8AC3E}">
+        <p14:creationId xmlns:p14="http://schemas.microsoft.com/office/powerpoint/2010/main" val="3813056222"/>
       </p:ext>
     </p:extLst>
   </p:cSld>
@@ -3299,7 +3388,7 @@
           <a:p>
             <a:fld id="{5D2A64DE-480B-420F-9649-4F8E696E08E0}" type="datetime1">
               <a:rPr lang="en-US" smtClean="0"/>
-              <a:t>1/29/22</a:t>
+              <a:t>2/2/2022</a:t>
             </a:fld>
             <a:endParaRPr lang="en-US"/>
           </a:p>
@@ -3623,7 +3712,7 @@
           <a:p>
             <a:fld id="{EA476A42-A091-4468-A075-64A31BE59948}" type="datetime1">
               <a:rPr lang="en-US" smtClean="0"/>
-              <a:t>1/29/22</a:t>
+              <a:t>2/2/2022</a:t>
             </a:fld>
             <a:endParaRPr lang="en-US"/>
           </a:p>
@@ -3821,7 +3910,7 @@
           <a:p>
             <a:fld id="{0D3616D0-8311-4107-9726-6B805E7D05BA}" type="datetime1">
               <a:rPr lang="en-US" smtClean="0"/>
-              <a:t>1/29/22</a:t>
+              <a:t>2/2/2022</a:t>
             </a:fld>
             <a:endParaRPr lang="en-US"/>
           </a:p>
@@ -4029,7 +4118,7 @@
           <a:p>
             <a:fld id="{3BC2557A-5C88-417A-A763-5AC779462A5F}" type="datetime1">
               <a:rPr lang="en-US" smtClean="0"/>
-              <a:t>1/29/22</a:t>
+              <a:t>2/2/2022</a:t>
             </a:fld>
             <a:endParaRPr lang="en-US"/>
           </a:p>
@@ -4553,7 +4642,7 @@
           <a:p>
             <a:fld id="{07C7BFD4-467E-4EDE-93EA-052F5B39A4E5}" type="datetime1">
               <a:rPr lang="en-US" smtClean="0"/>
-              <a:t>1/29/22</a:t>
+              <a:t>2/2/2022</a:t>
             </a:fld>
             <a:endParaRPr lang="en-US"/>
           </a:p>
@@ -4803,7 +4892,7 @@
           <a:p>
             <a:fld id="{07C7BFD4-467E-4EDE-93EA-052F5B39A4E5}" type="datetime1">
               <a:rPr lang="en-US" smtClean="0"/>
-              <a:t>1/29/22</a:t>
+              <a:t>2/2/2022</a:t>
             </a:fld>
             <a:endParaRPr lang="en-US"/>
           </a:p>
@@ -4985,7 +5074,7 @@
           <a:p>
             <a:fld id="{109E55A0-C911-4F03-82FC-7E5926047D46}" type="datetime1">
               <a:rPr lang="en-US" smtClean="0"/>
-              <a:t>1/29/22</a:t>
+              <a:t>2/2/2022</a:t>
             </a:fld>
             <a:endParaRPr lang="en-US"/>
           </a:p>
@@ -5298,7 +5387,7 @@
           <a:p>
             <a:fld id="{A533CBE2-D5BE-47AC-ADC2-9CDFC1D0CF90}" type="datetime1">
               <a:rPr lang="en-US" smtClean="0"/>
-              <a:t>1/29/22</a:t>
+              <a:t>2/2/2022</a:t>
             </a:fld>
             <a:endParaRPr lang="en-US"/>
           </a:p>
@@ -5599,7 +5688,7 @@
           <a:p>
             <a:fld id="{39B7EDB1-CE74-4951-85A2-0B01C2128E28}" type="datetime1">
               <a:rPr lang="en-US" smtClean="0"/>
-              <a:t>1/29/22</a:t>
+              <a:t>2/2/2022</a:t>
             </a:fld>
             <a:endParaRPr lang="en-US"/>
           </a:p>
@@ -6047,7 +6136,7 @@
           <a:p>
             <a:fld id="{2BC7EB92-A5C2-4807-A9DC-9EDE6CBFB241}" type="datetime1">
               <a:rPr lang="en-US" smtClean="0"/>
-              <a:t>1/29/22</a:t>
+              <a:t>2/2/2022</a:t>
             </a:fld>
             <a:endParaRPr lang="en-US"/>
           </a:p>
@@ -6160,7 +6249,7 @@
           <a:p>
             <a:fld id="{2B7B7EE0-7771-4CD5-9B2B-3550753A54A1}" type="datetime1">
               <a:rPr lang="en-US" smtClean="0"/>
-              <a:t>1/29/22</a:t>
+              <a:t>2/2/2022</a:t>
             </a:fld>
             <a:endParaRPr lang="en-US"/>
           </a:p>
@@ -6471,7 +6560,7 @@
           <a:p>
             <a:fld id="{F8B318B3-0E87-4416-A9B8-D891968C2727}" type="datetime1">
               <a:rPr lang="en-US" smtClean="0"/>
-              <a:t>1/29/22</a:t>
+              <a:t>2/2/2022</a:t>
             </a:fld>
             <a:endParaRPr lang="en-US"/>
           </a:p>
@@ -6712,7 +6801,7 @@
           <a:p>
             <a:fld id="{54D997E8-DDEE-43F1-8D9B-F8A1E11DE488}" type="datetime1">
               <a:rPr lang="en-US" smtClean="0"/>
-              <a:t>1/29/22</a:t>
+              <a:t>2/2/2022</a:t>
             </a:fld>
             <a:endParaRPr lang="en-US"/>
           </a:p>
@@ -9715,15 +9804,15 @@
       </p:grpSpPr>
       <p:sp>
         <p:nvSpPr>
-          <p:cNvPr id="2" name="Title 1">
-            <a:extLst>
-              <a:ext uri="{FF2B5EF4-FFF2-40B4-BE49-F238E27FC236}">
-                <a16:creationId xmlns:a16="http://schemas.microsoft.com/office/drawing/2014/main" id="{E743D407-5B53-49A7-9907-E801EA7FFD8E}"/>
-              </a:ext>
-            </a:extLst>
-          </p:cNvPr>
-          <p:cNvSpPr>
-            <a:spLocks noGrp="1"/>
+          <p:cNvPr id="24577" name="Rectangle 1">
+            <a:extLst>
+              <a:ext uri="{FF2B5EF4-FFF2-40B4-BE49-F238E27FC236}">
+                <a16:creationId xmlns:a16="http://schemas.microsoft.com/office/drawing/2014/main" id="{0F552F37-95EA-4CA9-A51E-15845F77768D}"/>
+              </a:ext>
+            </a:extLst>
+          </p:cNvPr>
+          <p:cNvSpPr>
+            <a:spLocks noGrp="1" noChangeArrowheads="1"/>
           </p:cNvSpPr>
           <p:nvPr>
             <p:ph type="title"/>
@@ -9731,100 +9820,376 @@
         </p:nvSpPr>
         <p:spPr/>
         <p:txBody>
-          <a:bodyPr/>
-          <a:lstStyle/>
-          <a:p>
-            <a:r>
-              <a:rPr lang="en-US" dirty="0"/>
-              <a:t>Learning Goals for this Lesson</a:t>
-            </a:r>
-          </a:p>
-        </p:txBody>
-      </p:sp>
-      <p:sp>
-        <p:nvSpPr>
-          <p:cNvPr id="3" name="Content Placeholder 2">
-            <a:extLst>
-              <a:ext uri="{FF2B5EF4-FFF2-40B4-BE49-F238E27FC236}">
-                <a16:creationId xmlns:a16="http://schemas.microsoft.com/office/drawing/2014/main" id="{AC300E2B-BFD0-4090-AFC5-FE82683F997F}"/>
-              </a:ext>
-            </a:extLst>
-          </p:cNvPr>
-          <p:cNvSpPr>
-            <a:spLocks noGrp="1"/>
-          </p:cNvSpPr>
-          <p:nvPr>
-            <p:ph idx="1"/>
-          </p:nvPr>
-        </p:nvSpPr>
-        <p:spPr/>
-        <p:txBody>
-          <a:bodyPr/>
-          <a:lstStyle/>
-          <a:p>
-            <a:r>
-              <a:rPr lang="en-US" dirty="0"/>
-              <a:t>At the end of this lesson, you should be able to</a:t>
-            </a:r>
-          </a:p>
-          <a:p>
-            <a:pPr lvl="1"/>
-            <a:r>
-              <a:rPr lang="en-US" dirty="0"/>
-              <a:t>Describe how agile planning manages uncertainty by creating detailed plans only for the most immediate tasks</a:t>
-            </a:r>
-          </a:p>
-          <a:p>
-            <a:pPr lvl="1"/>
-            <a:r>
-              <a:rPr lang="en-US" dirty="0"/>
-              <a:t>Explain how agile planning decomposes large projects into individual tasks that can be estimated</a:t>
-            </a:r>
-          </a:p>
-          <a:p>
-            <a:pPr lvl="1"/>
-            <a:r>
-              <a:rPr lang="en-US" dirty="0"/>
-              <a:t>Understand the key artifacts and process steps in Scrum</a:t>
-            </a:r>
-          </a:p>
-        </p:txBody>
-      </p:sp>
-      <p:sp>
-        <p:nvSpPr>
-          <p:cNvPr id="4" name="Slide Number Placeholder 3">
-            <a:extLst>
-              <a:ext uri="{FF2B5EF4-FFF2-40B4-BE49-F238E27FC236}">
-                <a16:creationId xmlns:a16="http://schemas.microsoft.com/office/drawing/2014/main" id="{B7BF3F82-6F96-41E0-9C15-23CE00076176}"/>
-              </a:ext>
-            </a:extLst>
-          </p:cNvPr>
-          <p:cNvSpPr>
-            <a:spLocks noGrp="1"/>
-          </p:cNvSpPr>
-          <p:nvPr>
-            <p:ph type="sldNum" sz="quarter" idx="12"/>
-          </p:nvPr>
-        </p:nvSpPr>
-        <p:spPr/>
-        <p:txBody>
-          <a:bodyPr/>
-          <a:lstStyle/>
-          <a:p>
-            <a:fld id="{20F37917-FD3A-4669-9018-DA04BCDD3D75}" type="slidenum">
-              <a:rPr lang="en-US" smtClean="0"/>
+          <a:bodyPr>
+            <a:normAutofit/>
+          </a:bodyPr>
+          <a:lstStyle/>
+          <a:p>
+            <a:r>
+              <a:rPr lang="en-US" altLang="en-US" sz="3600" dirty="0">
+                <a:solidFill>
+                  <a:srgbClr val="0070C0"/>
+                </a:solidFill>
+              </a:rPr>
+              <a:t>Why are Projects Late?</a:t>
+            </a:r>
+          </a:p>
+        </p:txBody>
+      </p:sp>
+      <p:sp>
+        <p:nvSpPr>
+          <p:cNvPr id="24578" name="Rectangle 2">
+            <a:extLst>
+              <a:ext uri="{FF2B5EF4-FFF2-40B4-BE49-F238E27FC236}">
+                <a16:creationId xmlns:a16="http://schemas.microsoft.com/office/drawing/2014/main" id="{0D5EEEC1-D5A1-4F56-953F-89717CF26340}"/>
+              </a:ext>
+            </a:extLst>
+          </p:cNvPr>
+          <p:cNvSpPr>
+            <a:spLocks noGrp="1" noChangeArrowheads="1"/>
+          </p:cNvSpPr>
+          <p:nvPr>
+            <p:ph type="body" idx="1"/>
+          </p:nvPr>
+        </p:nvSpPr>
+        <p:spPr>
+          <a:xfrm>
+            <a:off x="838199" y="1500159"/>
+            <a:ext cx="9948333" cy="4714373"/>
+          </a:xfrm>
+        </p:spPr>
+        <p:txBody>
+          <a:bodyPr>
+            <a:normAutofit/>
+          </a:bodyPr>
+          <a:lstStyle/>
+          <a:p>
+            <a:pPr>
+              <a:spcBef>
+                <a:spcPts val="703"/>
+              </a:spcBef>
+            </a:pPr>
+            <a:r>
+              <a:rPr lang="en-US" altLang="en-US" sz="2400" dirty="0">
+                <a:solidFill>
+                  <a:srgbClr val="000000"/>
+                </a:solidFill>
+              </a:rPr>
+              <a:t>an </a:t>
+            </a:r>
+            <a:r>
+              <a:rPr lang="en-US" altLang="en-US" sz="2400" dirty="0">
+                <a:solidFill>
+                  <a:srgbClr val="C00000"/>
+                </a:solidFill>
+              </a:rPr>
+              <a:t>unrealistic deadline </a:t>
+            </a:r>
+            <a:r>
+              <a:rPr lang="en-US" altLang="en-US" sz="2400" dirty="0">
+                <a:solidFill>
+                  <a:srgbClr val="000000"/>
+                </a:solidFill>
+              </a:rPr>
+              <a:t>established by someone outside the software development group</a:t>
+            </a:r>
+          </a:p>
+          <a:p>
+            <a:pPr>
+              <a:spcBef>
+                <a:spcPts val="703"/>
+              </a:spcBef>
+            </a:pPr>
+            <a:r>
+              <a:rPr lang="en-US" altLang="en-US" sz="2400" dirty="0">
+                <a:solidFill>
+                  <a:srgbClr val="C00000"/>
+                </a:solidFill>
+              </a:rPr>
+              <a:t>changing customer requirements </a:t>
+            </a:r>
+            <a:r>
+              <a:rPr lang="en-US" altLang="en-US" sz="2400" dirty="0">
+                <a:solidFill>
+                  <a:srgbClr val="000000"/>
+                </a:solidFill>
+              </a:rPr>
+              <a:t>that are not reflected in schedule changes;</a:t>
+            </a:r>
+          </a:p>
+          <a:p>
+            <a:pPr>
+              <a:spcBef>
+                <a:spcPts val="703"/>
+              </a:spcBef>
+            </a:pPr>
+            <a:r>
+              <a:rPr lang="en-US" altLang="en-US" sz="2400" dirty="0">
+                <a:solidFill>
+                  <a:srgbClr val="000000"/>
+                </a:solidFill>
+              </a:rPr>
+              <a:t>an </a:t>
+            </a:r>
+            <a:r>
+              <a:rPr lang="en-US" altLang="en-US" sz="2400" dirty="0">
+                <a:solidFill>
+                  <a:srgbClr val="C00000"/>
+                </a:solidFill>
+              </a:rPr>
+              <a:t>honest underestimate </a:t>
+            </a:r>
+            <a:r>
+              <a:rPr lang="en-US" altLang="en-US" sz="2400" dirty="0">
+                <a:solidFill>
+                  <a:srgbClr val="000000"/>
+                </a:solidFill>
+              </a:rPr>
+              <a:t>of the amount of effort and/or the number of resources that will be required to do the job;</a:t>
+            </a:r>
+          </a:p>
+          <a:p>
+            <a:pPr>
+              <a:spcBef>
+                <a:spcPts val="703"/>
+              </a:spcBef>
+            </a:pPr>
+            <a:r>
+              <a:rPr lang="en-US" altLang="en-US" sz="2400" dirty="0">
+                <a:solidFill>
+                  <a:srgbClr val="C00000"/>
+                </a:solidFill>
+              </a:rPr>
+              <a:t>predictable and/or unpredictable risks </a:t>
+            </a:r>
+            <a:r>
+              <a:rPr lang="en-US" altLang="en-US" sz="2400" dirty="0">
+                <a:solidFill>
+                  <a:srgbClr val="000000"/>
+                </a:solidFill>
+              </a:rPr>
+              <a:t>that were not considered when the project commenced;</a:t>
+            </a:r>
+          </a:p>
+          <a:p>
+            <a:pPr>
+              <a:spcBef>
+                <a:spcPts val="703"/>
+              </a:spcBef>
+            </a:pPr>
+            <a:r>
+              <a:rPr lang="en-US" altLang="en-US" sz="2400" dirty="0">
+                <a:solidFill>
+                  <a:srgbClr val="C00000"/>
+                </a:solidFill>
+              </a:rPr>
+              <a:t>technical difficulties </a:t>
+            </a:r>
+            <a:r>
+              <a:rPr lang="en-US" altLang="en-US" sz="2400" dirty="0">
+                <a:solidFill>
+                  <a:srgbClr val="000000"/>
+                </a:solidFill>
+              </a:rPr>
+              <a:t>that could not have been foreseen in advance;</a:t>
+            </a:r>
+          </a:p>
+          <a:p>
+            <a:pPr>
+              <a:spcBef>
+                <a:spcPts val="703"/>
+              </a:spcBef>
+            </a:pPr>
+            <a:r>
+              <a:rPr lang="en-US" altLang="en-US" sz="2400" dirty="0">
+                <a:solidFill>
+                  <a:srgbClr val="C00000"/>
+                </a:solidFill>
+              </a:rPr>
+              <a:t>human difficulties </a:t>
+            </a:r>
+            <a:r>
+              <a:rPr lang="en-US" altLang="en-US" sz="2400" dirty="0">
+                <a:solidFill>
+                  <a:srgbClr val="000000"/>
+                </a:solidFill>
+              </a:rPr>
+              <a:t>that could not have been foreseen in advance;</a:t>
+            </a:r>
+          </a:p>
+          <a:p>
+            <a:pPr>
+              <a:spcBef>
+                <a:spcPts val="703"/>
+              </a:spcBef>
+            </a:pPr>
+            <a:r>
+              <a:rPr lang="en-US" altLang="en-US" sz="2400" dirty="0">
+                <a:solidFill>
+                  <a:srgbClr val="C00000"/>
+                </a:solidFill>
+              </a:rPr>
+              <a:t>miscommunication</a:t>
+            </a:r>
+            <a:r>
+              <a:rPr lang="en-US" altLang="en-US" sz="2400" dirty="0">
+                <a:solidFill>
+                  <a:srgbClr val="000000"/>
+                </a:solidFill>
+              </a:rPr>
+              <a:t> among project staff that results in delays;</a:t>
+            </a:r>
+          </a:p>
+          <a:p>
+            <a:pPr>
+              <a:spcBef>
+                <a:spcPts val="703"/>
+              </a:spcBef>
+            </a:pPr>
+            <a:r>
+              <a:rPr lang="en-US" altLang="en-US" sz="2400" dirty="0">
+                <a:solidFill>
+                  <a:srgbClr val="000000"/>
+                </a:solidFill>
+              </a:rPr>
+              <a:t>a failure by project management to recognize that the project is </a:t>
+            </a:r>
+            <a:r>
+              <a:rPr lang="en-US" altLang="en-US" sz="2400" dirty="0">
+                <a:solidFill>
+                  <a:srgbClr val="C00000"/>
+                </a:solidFill>
+              </a:rPr>
+              <a:t>falling behind schedule</a:t>
+            </a:r>
+            <a:r>
+              <a:rPr lang="en-US" altLang="en-US" sz="2400" dirty="0">
+                <a:solidFill>
+                  <a:srgbClr val="000000"/>
+                </a:solidFill>
+              </a:rPr>
+              <a:t> and a </a:t>
+            </a:r>
+            <a:r>
+              <a:rPr lang="en-US" altLang="en-US" sz="2400" dirty="0">
+                <a:solidFill>
+                  <a:srgbClr val="C00000"/>
+                </a:solidFill>
+              </a:rPr>
+              <a:t>lack of action to correct the problem</a:t>
+            </a:r>
+            <a:endParaRPr lang="en-US" altLang="en-US" sz="1600" dirty="0">
+              <a:solidFill>
+                <a:srgbClr val="C00000"/>
+              </a:solidFill>
+            </a:endParaRPr>
+          </a:p>
+        </p:txBody>
+      </p:sp>
+      <p:sp>
+        <p:nvSpPr>
+          <p:cNvPr id="24579" name="Text Box 3">
+            <a:extLst>
+              <a:ext uri="{FF2B5EF4-FFF2-40B4-BE49-F238E27FC236}">
+                <a16:creationId xmlns:a16="http://schemas.microsoft.com/office/drawing/2014/main" id="{C1802033-C70C-401D-81D8-90438BC62471}"/>
+              </a:ext>
+            </a:extLst>
+          </p:cNvPr>
+          <p:cNvSpPr txBox="1">
+            <a:spLocks/>
+          </p:cNvSpPr>
+          <p:nvPr/>
+        </p:nvSpPr>
+        <p:spPr bwMode="auto">
+          <a:xfrm>
+            <a:off x="11084571" y="6412602"/>
+            <a:ext cx="213200" cy="223587"/>
+          </a:xfrm>
+          <a:prstGeom prst="rect">
+            <a:avLst/>
+          </a:prstGeom>
+          <a:noFill/>
+          <a:ln>
+            <a:noFill/>
+          </a:ln>
+          <a:effectLst/>
+          <a:extLst>
+            <a:ext uri="{909E8E84-426E-40DD-AFC4-6F175D3DCCD1}">
+              <a14:hiddenFill xmlns:a14="http://schemas.microsoft.com/office/drawing/2010/main">
+                <a:solidFill>
+                  <a:srgbClr val="FFFFFF"/>
+                </a:solidFill>
+              </a14:hiddenFill>
+            </a:ext>
+            <a:ext uri="{91240B29-F687-4F45-9708-019B960494DF}">
+              <a14:hiddenLine xmlns:a14="http://schemas.microsoft.com/office/drawing/2010/main" w="12700" cap="flat" cmpd="sng">
+                <a:solidFill>
+                  <a:srgbClr val="000000"/>
+                </a:solidFill>
+                <a:prstDash val="solid"/>
+                <a:miter lim="400000"/>
+                <a:headEnd type="none" w="med" len="med"/>
+                <a:tailEnd type="none" w="med" len="med"/>
+              </a14:hiddenLine>
+            </a:ext>
+            <a:ext uri="{AF507438-7753-43E0-B8FC-AC1667EBCBE1}">
+              <a14:hiddenEffects xmlns:a14="http://schemas.microsoft.com/office/drawing/2010/main">
+                <a:effectLst>
+                  <a:outerShdw dist="35921" dir="2700000" algn="ctr" rotWithShape="0">
+                    <a:srgbClr val="808080"/>
+                  </a:outerShdw>
+                </a:effectLst>
+              </a14:hiddenEffects>
+            </a:ext>
+          </a:extLst>
+        </p:spPr>
+        <p:txBody>
+          <a:bodyPr wrap="none" lIns="35719" tIns="35719" rIns="35719" bIns="35719" anchor="b">
+            <a:spAutoFit/>
+          </a:bodyPr>
+          <a:lstStyle/>
+          <a:p>
+            <a:pPr algn="r" defTabSz="410751" fontAlgn="base" hangingPunct="0">
+              <a:spcBef>
+                <a:spcPct val="0"/>
+              </a:spcBef>
+              <a:spcAft>
+                <a:spcPct val="0"/>
+              </a:spcAft>
+            </a:pPr>
+            <a:fld id="{DF5F2E70-75DF-449F-9F16-8040D1128174}" type="slidenum">
+              <a:rPr lang="en-US" altLang="en-US" sz="984">
+                <a:solidFill>
+                  <a:srgbClr val="000000"/>
+                </a:solidFill>
+                <a:latin typeface="Helvetica Neue"/>
+                <a:ea typeface="Helvetica Neue"/>
+                <a:cs typeface="Helvetica Neue"/>
+                <a:sym typeface="Helvetica Neue"/>
+              </a:rPr>
+              <a:pPr algn="r" defTabSz="410751" fontAlgn="base" hangingPunct="0">
+                <a:spcBef>
+                  <a:spcPct val="0"/>
+                </a:spcBef>
+                <a:spcAft>
+                  <a:spcPct val="0"/>
+                </a:spcAft>
+              </a:pPr>
               <a:t>19</a:t>
             </a:fld>
-            <a:endParaRPr lang="en-US"/>
+            <a:endParaRPr lang="en-US" altLang="en-US" sz="984">
+              <a:solidFill>
+                <a:srgbClr val="000000"/>
+              </a:solidFill>
+              <a:latin typeface="Helvetica Neue"/>
+              <a:ea typeface="Helvetica Neue"/>
+              <a:cs typeface="Helvetica Neue"/>
+              <a:sym typeface="Helvetica Neue"/>
+            </a:endParaRPr>
           </a:p>
         </p:txBody>
       </p:sp>
     </p:spTree>
-    <p:extLst>
-      <p:ext uri="{BB962C8B-B14F-4D97-AF65-F5344CB8AC3E}">
-        <p14:creationId xmlns:p14="http://schemas.microsoft.com/office/powerpoint/2010/main" val="1694982008"/>
-      </p:ext>
-    </p:extLst>
   </p:cSld>
   <p:clrMapOvr>
     <a:masterClrMapping/>
@@ -9959,6 +10324,142 @@
     <p:extLst>
       <p:ext uri="{BB962C8B-B14F-4D97-AF65-F5344CB8AC3E}">
         <p14:creationId xmlns:p14="http://schemas.microsoft.com/office/powerpoint/2010/main" val="3019279322"/>
+      </p:ext>
+    </p:extLst>
+  </p:cSld>
+  <p:clrMapOvr>
+    <a:masterClrMapping/>
+  </p:clrMapOvr>
+</p:sld>
+</file>
+
+<file path=ppt/slides/slide20.xml><?xml version="1.0" encoding="utf-8"?>
+<p:sld xmlns:a="http://schemas.openxmlformats.org/drawingml/2006/main" xmlns:r="http://schemas.openxmlformats.org/officeDocument/2006/relationships" xmlns:p="http://schemas.openxmlformats.org/presentationml/2006/main">
+  <p:cSld>
+    <p:spTree>
+      <p:nvGrpSpPr>
+        <p:cNvPr id="1" name=""/>
+        <p:cNvGrpSpPr/>
+        <p:nvPr/>
+      </p:nvGrpSpPr>
+      <p:grpSpPr>
+        <a:xfrm>
+          <a:off x="0" y="0"/>
+          <a:ext cx="0" cy="0"/>
+          <a:chOff x="0" y="0"/>
+          <a:chExt cx="0" cy="0"/>
+        </a:xfrm>
+      </p:grpSpPr>
+      <p:sp>
+        <p:nvSpPr>
+          <p:cNvPr id="2" name="Title 1">
+            <a:extLst>
+              <a:ext uri="{FF2B5EF4-FFF2-40B4-BE49-F238E27FC236}">
+                <a16:creationId xmlns:a16="http://schemas.microsoft.com/office/drawing/2014/main" id="{E743D407-5B53-49A7-9907-E801EA7FFD8E}"/>
+              </a:ext>
+            </a:extLst>
+          </p:cNvPr>
+          <p:cNvSpPr>
+            <a:spLocks noGrp="1"/>
+          </p:cNvSpPr>
+          <p:nvPr>
+            <p:ph type="title"/>
+          </p:nvPr>
+        </p:nvSpPr>
+        <p:spPr/>
+        <p:txBody>
+          <a:bodyPr/>
+          <a:lstStyle/>
+          <a:p>
+            <a:r>
+              <a:rPr lang="en-US" dirty="0"/>
+              <a:t>Learning Goals for this Lesson</a:t>
+            </a:r>
+          </a:p>
+        </p:txBody>
+      </p:sp>
+      <p:sp>
+        <p:nvSpPr>
+          <p:cNvPr id="3" name="Content Placeholder 2">
+            <a:extLst>
+              <a:ext uri="{FF2B5EF4-FFF2-40B4-BE49-F238E27FC236}">
+                <a16:creationId xmlns:a16="http://schemas.microsoft.com/office/drawing/2014/main" id="{AC300E2B-BFD0-4090-AFC5-FE82683F997F}"/>
+              </a:ext>
+            </a:extLst>
+          </p:cNvPr>
+          <p:cNvSpPr>
+            <a:spLocks noGrp="1"/>
+          </p:cNvSpPr>
+          <p:nvPr>
+            <p:ph idx="1"/>
+          </p:nvPr>
+        </p:nvSpPr>
+        <p:spPr/>
+        <p:txBody>
+          <a:bodyPr/>
+          <a:lstStyle/>
+          <a:p>
+            <a:r>
+              <a:rPr lang="en-US" dirty="0"/>
+              <a:t>At the end of this lesson, you should be able to</a:t>
+            </a:r>
+          </a:p>
+          <a:p>
+            <a:pPr lvl="1"/>
+            <a:r>
+              <a:rPr lang="en-US" dirty="0"/>
+              <a:t>Describe how agile planning manages uncertainty by creating detailed plans only for the most immediate tasks</a:t>
+            </a:r>
+          </a:p>
+          <a:p>
+            <a:pPr lvl="1"/>
+            <a:r>
+              <a:rPr lang="en-US" dirty="0"/>
+              <a:t>Explain how agile planning decomposes large projects into individual tasks that can be estimated</a:t>
+            </a:r>
+          </a:p>
+          <a:p>
+            <a:pPr lvl="1"/>
+            <a:r>
+              <a:rPr lang="en-US" dirty="0"/>
+              <a:t>Understand the key artifacts and process steps in Scrum</a:t>
+            </a:r>
+          </a:p>
+        </p:txBody>
+      </p:sp>
+      <p:sp>
+        <p:nvSpPr>
+          <p:cNvPr id="4" name="Slide Number Placeholder 3">
+            <a:extLst>
+              <a:ext uri="{FF2B5EF4-FFF2-40B4-BE49-F238E27FC236}">
+                <a16:creationId xmlns:a16="http://schemas.microsoft.com/office/drawing/2014/main" id="{B7BF3F82-6F96-41E0-9C15-23CE00076176}"/>
+              </a:ext>
+            </a:extLst>
+          </p:cNvPr>
+          <p:cNvSpPr>
+            <a:spLocks noGrp="1"/>
+          </p:cNvSpPr>
+          <p:nvPr>
+            <p:ph type="sldNum" sz="quarter" idx="12"/>
+          </p:nvPr>
+        </p:nvSpPr>
+        <p:spPr/>
+        <p:txBody>
+          <a:bodyPr/>
+          <a:lstStyle/>
+          <a:p>
+            <a:fld id="{20F37917-FD3A-4669-9018-DA04BCDD3D75}" type="slidenum">
+              <a:rPr lang="en-US" smtClean="0"/>
+              <a:t>20</a:t>
+            </a:fld>
+            <a:endParaRPr lang="en-US"/>
+          </a:p>
+        </p:txBody>
+      </p:sp>
+    </p:spTree>
+    <p:extLst>
+      <p:ext uri="{BB962C8B-B14F-4D97-AF65-F5344CB8AC3E}">
+        <p14:creationId xmlns:p14="http://schemas.microsoft.com/office/powerpoint/2010/main" val="1694982008"/>
       </p:ext>
     </p:extLst>
   </p:cSld>

</xml_diff>